<commit_message>
Quelques modifs sur les ppts
</commit_message>
<xml_diff>
--- a/docs/slides/5_Publish.pptx
+++ b/docs/slides/5_Publish.pptx
@@ -853,7 +853,7 @@
             <a:fld id="{B61BEF0D-F0BB-DE4B-95CE-6DB70DBA9567}" type="datetimeFigureOut">
               <a:rPr lang="en-US" dirty="0"/>
               <a:pPr/>
-              <a:t>6/16/2021</a:t>
+              <a:t>3/18/2022</a:t>
             </a:fld>
             <a:endParaRPr lang="en-US" dirty="0"/>
           </a:p>
@@ -1101,7 +1101,7 @@
             <a:fld id="{B61BEF0D-F0BB-DE4B-95CE-6DB70DBA9567}" type="datetimeFigureOut">
               <a:rPr lang="en-US" dirty="0"/>
               <a:pPr/>
-              <a:t>6/16/2021</a:t>
+              <a:t>3/18/2022</a:t>
             </a:fld>
             <a:endParaRPr lang="en-US" dirty="0"/>
           </a:p>
@@ -1412,7 +1412,7 @@
             <a:fld id="{B61BEF0D-F0BB-DE4B-95CE-6DB70DBA9567}" type="datetimeFigureOut">
               <a:rPr lang="en-US" dirty="0"/>
               <a:pPr/>
-              <a:t>6/16/2021</a:t>
+              <a:t>3/18/2022</a:t>
             </a:fld>
             <a:endParaRPr lang="en-US" dirty="0"/>
           </a:p>
@@ -1750,7 +1750,7 @@
             <a:fld id="{B61BEF0D-F0BB-DE4B-95CE-6DB70DBA9567}" type="datetimeFigureOut">
               <a:rPr lang="en-US" dirty="0"/>
               <a:pPr/>
-              <a:t>6/16/2021</a:t>
+              <a:t>3/18/2022</a:t>
             </a:fld>
             <a:endParaRPr lang="en-US" dirty="0"/>
           </a:p>
@@ -2061,7 +2061,7 @@
             <a:fld id="{B61BEF0D-F0BB-DE4B-95CE-6DB70DBA9567}" type="datetimeFigureOut">
               <a:rPr lang="en-US" dirty="0"/>
               <a:pPr/>
-              <a:t>6/16/2021</a:t>
+              <a:t>3/18/2022</a:t>
             </a:fld>
             <a:endParaRPr lang="en-US" dirty="0"/>
           </a:p>
@@ -2451,7 +2451,7 @@
             <a:fld id="{B61BEF0D-F0BB-DE4B-95CE-6DB70DBA9567}" type="datetimeFigureOut">
               <a:rPr lang="en-US" dirty="0"/>
               <a:pPr/>
-              <a:t>6/16/2021</a:t>
+              <a:t>3/18/2022</a:t>
             </a:fld>
             <a:endParaRPr lang="en-US" dirty="0"/>
           </a:p>
@@ -2617,7 +2617,7 @@
           <a:p>
             <a:fld id="{55C6B4A9-1611-4792-9094-5F34BCA07E0B}" type="datetimeFigureOut">
               <a:rPr lang="en-US" dirty="0"/>
-              <a:t>6/16/2021</a:t>
+              <a:t>3/18/2022</a:t>
             </a:fld>
             <a:endParaRPr lang="en-US" dirty="0"/>
           </a:p>
@@ -2793,7 +2793,7 @@
             <a:fld id="{B61BEF0D-F0BB-DE4B-95CE-6DB70DBA9567}" type="datetimeFigureOut">
               <a:rPr lang="en-US" dirty="0"/>
               <a:pPr/>
-              <a:t>6/16/2021</a:t>
+              <a:t>3/18/2022</a:t>
             </a:fld>
             <a:endParaRPr lang="en-US" dirty="0"/>
           </a:p>
@@ -2966,7 +2966,7 @@
             <a:fld id="{B61BEF0D-F0BB-DE4B-95CE-6DB70DBA9567}" type="datetimeFigureOut">
               <a:rPr lang="en-US" dirty="0"/>
               <a:pPr/>
-              <a:t>6/16/2021</a:t>
+              <a:t>3/18/2022</a:t>
             </a:fld>
             <a:endParaRPr lang="en-US" dirty="0"/>
           </a:p>
@@ -3210,7 +3210,7 @@
             <a:fld id="{B61BEF0D-F0BB-DE4B-95CE-6DB70DBA9567}" type="datetimeFigureOut">
               <a:rPr lang="en-US" dirty="0"/>
               <a:pPr/>
-              <a:t>6/16/2021</a:t>
+              <a:t>3/18/2022</a:t>
             </a:fld>
             <a:endParaRPr lang="en-US" dirty="0"/>
           </a:p>
@@ -3438,7 +3438,7 @@
           <a:p>
             <a:fld id="{EB712588-04B1-427B-82EE-E8DB90309F08}" type="datetimeFigureOut">
               <a:rPr lang="en-US" dirty="0"/>
-              <a:t>6/16/2021</a:t>
+              <a:t>3/18/2022</a:t>
             </a:fld>
             <a:endParaRPr lang="en-US" dirty="0"/>
           </a:p>
@@ -3808,7 +3808,7 @@
             <a:fld id="{B61BEF0D-F0BB-DE4B-95CE-6DB70DBA9567}" type="datetimeFigureOut">
               <a:rPr lang="en-US" dirty="0"/>
               <a:pPr/>
-              <a:t>6/16/2021</a:t>
+              <a:t>3/18/2022</a:t>
             </a:fld>
             <a:endParaRPr lang="en-US" dirty="0"/>
           </a:p>
@@ -3928,7 +3928,7 @@
             <a:fld id="{B61BEF0D-F0BB-DE4B-95CE-6DB70DBA9567}" type="datetimeFigureOut">
               <a:rPr lang="en-US" dirty="0"/>
               <a:pPr/>
-              <a:t>6/16/2021</a:t>
+              <a:t>3/18/2022</a:t>
             </a:fld>
             <a:endParaRPr lang="en-US" dirty="0"/>
           </a:p>
@@ -4020,7 +4020,7 @@
             <a:fld id="{B61BEF0D-F0BB-DE4B-95CE-6DB70DBA9567}" type="datetimeFigureOut">
               <a:rPr lang="en-US" dirty="0"/>
               <a:pPr/>
-              <a:t>6/16/2021</a:t>
+              <a:t>3/18/2022</a:t>
             </a:fld>
             <a:endParaRPr lang="en-US" dirty="0"/>
           </a:p>
@@ -4271,7 +4271,7 @@
           <a:p>
             <a:fld id="{42A54C80-263E-416B-A8E0-580EDEADCBDC}" type="datetimeFigureOut">
               <a:rPr lang="en-US" dirty="0"/>
-              <a:t>6/16/2021</a:t>
+              <a:t>3/18/2022</a:t>
             </a:fld>
             <a:endParaRPr lang="en-US" dirty="0"/>
           </a:p>
@@ -4530,7 +4530,7 @@
             <a:fld id="{B61BEF0D-F0BB-DE4B-95CE-6DB70DBA9567}" type="datetimeFigureOut">
               <a:rPr lang="en-US" dirty="0"/>
               <a:pPr/>
-              <a:t>6/16/2021</a:t>
+              <a:t>3/18/2022</a:t>
             </a:fld>
             <a:endParaRPr lang="en-US" dirty="0"/>
           </a:p>
@@ -5270,7 +5270,7 @@
             <a:fld id="{B61BEF0D-F0BB-DE4B-95CE-6DB70DBA9567}" type="datetimeFigureOut">
               <a:rPr lang="en-US" dirty="0"/>
               <a:pPr/>
-              <a:t>6/16/2021</a:t>
+              <a:t>3/18/2022</a:t>
             </a:fld>
             <a:endParaRPr lang="en-US" dirty="0"/>
           </a:p>
@@ -6207,7 +6207,7 @@
         <p:spPr>
           <a:xfrm>
             <a:off x="677334" y="609600"/>
-            <a:ext cx="4411033" cy="1320800"/>
+            <a:ext cx="5331580" cy="1320800"/>
           </a:xfrm>
         </p:spPr>
         <p:txBody>
@@ -6236,12 +6236,102 @@
             <p:ph idx="1"/>
           </p:nvPr>
         </p:nvSpPr>
-        <p:spPr/>
+        <p:spPr>
+          <a:xfrm>
+            <a:off x="677333" y="2160589"/>
+            <a:ext cx="5775717" cy="3880773"/>
+          </a:xfrm>
+        </p:spPr>
         <p:txBody>
           <a:bodyPr/>
           <a:lstStyle/>
           <a:p>
-            <a:endParaRPr lang="fr-CA"/>
+            <a:r>
+              <a:rPr lang="fr-CA" dirty="0" err="1" smtClean="0"/>
+              <a:t>Submodels</a:t>
+            </a:r>
+            <a:r>
+              <a:rPr lang="fr-CA" dirty="0" smtClean="0"/>
+              <a:t>:</a:t>
+            </a:r>
+          </a:p>
+          <a:p>
+            <a:pPr marL="0" indent="0">
+              <a:buNone/>
+            </a:pPr>
+            <a:r>
+              <a:rPr lang="fr-CA" dirty="0">
+                <a:hlinkClick r:id="rId2"/>
+              </a:rPr>
+              <a:t>https://</a:t>
+            </a:r>
+            <a:r>
+              <a:rPr lang="fr-CA" dirty="0" smtClean="0">
+                <a:hlinkClick r:id="rId2"/>
+              </a:rPr>
+              <a:t>github.com/SarahBauduin/appendix_wolfIBM/blob/master/R/submodels.R</a:t>
+            </a:r>
+            <a:endParaRPr lang="fr-CA" dirty="0" smtClean="0"/>
+          </a:p>
+          <a:p>
+            <a:pPr marL="0" indent="0">
+              <a:buNone/>
+            </a:pPr>
+            <a:endParaRPr lang="fr-CA" dirty="0"/>
+          </a:p>
+          <a:p>
+            <a:r>
+              <a:rPr lang="fr-CA" dirty="0" smtClean="0"/>
+              <a:t>Loop:</a:t>
+            </a:r>
+          </a:p>
+          <a:p>
+            <a:pPr marL="0" indent="0">
+              <a:buNone/>
+            </a:pPr>
+            <a:r>
+              <a:rPr lang="fr-CA" dirty="0">
+                <a:hlinkClick r:id="rId3"/>
+              </a:rPr>
+              <a:t>https://</a:t>
+            </a:r>
+            <a:r>
+              <a:rPr lang="fr-CA" dirty="0" smtClean="0">
+                <a:hlinkClick r:id="rId3"/>
+              </a:rPr>
+              <a:t>github.com/SarahBauduin/appendix_wolfIBM/blob/master/R/run.R</a:t>
+            </a:r>
+            <a:endParaRPr lang="fr-CA" dirty="0" smtClean="0"/>
+          </a:p>
+          <a:p>
+            <a:pPr marL="0" indent="0">
+              <a:buNone/>
+            </a:pPr>
+            <a:endParaRPr lang="fr-CA" dirty="0" smtClean="0"/>
+          </a:p>
+          <a:p>
+            <a:r>
+              <a:rPr lang="fr-CA" dirty="0" smtClean="0"/>
+              <a:t>ODD:</a:t>
+            </a:r>
+          </a:p>
+          <a:p>
+            <a:pPr marL="0" indent="0">
+              <a:buNone/>
+            </a:pPr>
+            <a:r>
+              <a:rPr lang="fr-CA" dirty="0">
+                <a:hlinkClick r:id="rId4" tooltip="Persistent link using digital object identifier"/>
+              </a:rPr>
+              <a:t>https://doi.org/10.1016/j.ecolmodel.2020.109209</a:t>
+            </a:r>
+            <a:endParaRPr lang="fr-CA" dirty="0" smtClean="0"/>
+          </a:p>
+          <a:p>
+            <a:pPr marL="0" indent="0">
+              <a:buNone/>
+            </a:pPr>
+            <a:endParaRPr lang="fr-CA" dirty="0"/>
           </a:p>
         </p:txBody>
       </p:sp>
@@ -6254,13 +6344,13 @@
           <p:nvPr/>
         </p:nvPicPr>
         <p:blipFill rotWithShape="1">
-          <a:blip r:embed="rId2"/>
+          <a:blip r:embed="rId5"/>
           <a:srcRect l="22325" t="17006" r="58519" b="14770"/>
           <a:stretch/>
         </p:blipFill>
         <p:spPr>
           <a:xfrm>
-            <a:off x="4569917" y="0"/>
+            <a:off x="6221835" y="-11036"/>
             <a:ext cx="3052167" cy="6793957"/>
           </a:xfrm>
           <a:prstGeom prst="rect">
@@ -6325,7 +6415,234 @@
   <p:timing>
     <p:tnLst>
       <p:par>
-        <p:cTn id="1" dur="indefinite" restart="never" nodeType="tmRoot"/>
+        <p:cTn id="1" dur="indefinite" restart="never" nodeType="tmRoot">
+          <p:childTnLst>
+            <p:seq concurrent="1" nextAc="seek">
+              <p:cTn id="2" dur="indefinite" nodeType="mainSeq">
+                <p:childTnLst>
+                  <p:par>
+                    <p:cTn id="3" fill="hold">
+                      <p:stCondLst>
+                        <p:cond delay="indefinite"/>
+                      </p:stCondLst>
+                      <p:childTnLst>
+                        <p:par>
+                          <p:cTn id="4" fill="hold">
+                            <p:stCondLst>
+                              <p:cond delay="0"/>
+                            </p:stCondLst>
+                            <p:childTnLst>
+                              <p:par>
+                                <p:cTn id="5" presetID="1" presetClass="entr" presetSubtype="0" fill="hold" nodeType="clickEffect">
+                                  <p:stCondLst>
+                                    <p:cond delay="0"/>
+                                  </p:stCondLst>
+                                  <p:childTnLst>
+                                    <p:set>
+                                      <p:cBhvr>
+                                        <p:cTn id="6" dur="1" fill="hold">
+                                          <p:stCondLst>
+                                            <p:cond delay="0"/>
+                                          </p:stCondLst>
+                                        </p:cTn>
+                                        <p:tgtEl>
+                                          <p:spTgt spid="3">
+                                            <p:txEl>
+                                              <p:pRg st="0" end="0"/>
+                                            </p:txEl>
+                                          </p:spTgt>
+                                        </p:tgtEl>
+                                        <p:attrNameLst>
+                                          <p:attrName>style.visibility</p:attrName>
+                                        </p:attrNameLst>
+                                      </p:cBhvr>
+                                      <p:to>
+                                        <p:strVal val="visible"/>
+                                      </p:to>
+                                    </p:set>
+                                  </p:childTnLst>
+                                </p:cTn>
+                              </p:par>
+                              <p:par>
+                                <p:cTn id="7" presetID="1" presetClass="entr" presetSubtype="0" fill="hold" nodeType="withEffect">
+                                  <p:stCondLst>
+                                    <p:cond delay="0"/>
+                                  </p:stCondLst>
+                                  <p:childTnLst>
+                                    <p:set>
+                                      <p:cBhvr>
+                                        <p:cTn id="8" dur="1" fill="hold">
+                                          <p:stCondLst>
+                                            <p:cond delay="0"/>
+                                          </p:stCondLst>
+                                        </p:cTn>
+                                        <p:tgtEl>
+                                          <p:spTgt spid="3">
+                                            <p:txEl>
+                                              <p:pRg st="1" end="1"/>
+                                            </p:txEl>
+                                          </p:spTgt>
+                                        </p:tgtEl>
+                                        <p:attrNameLst>
+                                          <p:attrName>style.visibility</p:attrName>
+                                        </p:attrNameLst>
+                                      </p:cBhvr>
+                                      <p:to>
+                                        <p:strVal val="visible"/>
+                                      </p:to>
+                                    </p:set>
+                                  </p:childTnLst>
+                                </p:cTn>
+                              </p:par>
+                              <p:par>
+                                <p:cTn id="9" presetID="1" presetClass="entr" presetSubtype="0" fill="hold" nodeType="withEffect">
+                                  <p:stCondLst>
+                                    <p:cond delay="0"/>
+                                  </p:stCondLst>
+                                  <p:childTnLst>
+                                    <p:set>
+                                      <p:cBhvr>
+                                        <p:cTn id="10" dur="1" fill="hold">
+                                          <p:stCondLst>
+                                            <p:cond delay="0"/>
+                                          </p:stCondLst>
+                                        </p:cTn>
+                                        <p:tgtEl>
+                                          <p:spTgt spid="3">
+                                            <p:txEl>
+                                              <p:pRg st="3" end="3"/>
+                                            </p:txEl>
+                                          </p:spTgt>
+                                        </p:tgtEl>
+                                        <p:attrNameLst>
+                                          <p:attrName>style.visibility</p:attrName>
+                                        </p:attrNameLst>
+                                      </p:cBhvr>
+                                      <p:to>
+                                        <p:strVal val="visible"/>
+                                      </p:to>
+                                    </p:set>
+                                  </p:childTnLst>
+                                </p:cTn>
+                              </p:par>
+                              <p:par>
+                                <p:cTn id="11" presetID="1" presetClass="entr" presetSubtype="0" fill="hold" nodeType="withEffect">
+                                  <p:stCondLst>
+                                    <p:cond delay="0"/>
+                                  </p:stCondLst>
+                                  <p:childTnLst>
+                                    <p:set>
+                                      <p:cBhvr>
+                                        <p:cTn id="12" dur="1" fill="hold">
+                                          <p:stCondLst>
+                                            <p:cond delay="0"/>
+                                          </p:stCondLst>
+                                        </p:cTn>
+                                        <p:tgtEl>
+                                          <p:spTgt spid="3">
+                                            <p:txEl>
+                                              <p:pRg st="4" end="4"/>
+                                            </p:txEl>
+                                          </p:spTgt>
+                                        </p:tgtEl>
+                                        <p:attrNameLst>
+                                          <p:attrName>style.visibility</p:attrName>
+                                        </p:attrNameLst>
+                                      </p:cBhvr>
+                                      <p:to>
+                                        <p:strVal val="visible"/>
+                                      </p:to>
+                                    </p:set>
+                                  </p:childTnLst>
+                                </p:cTn>
+                              </p:par>
+                              <p:par>
+                                <p:cTn id="13" presetID="1" presetClass="entr" presetSubtype="0" fill="hold" nodeType="withEffect">
+                                  <p:stCondLst>
+                                    <p:cond delay="0"/>
+                                  </p:stCondLst>
+                                  <p:childTnLst>
+                                    <p:set>
+                                      <p:cBhvr>
+                                        <p:cTn id="14" dur="1" fill="hold">
+                                          <p:stCondLst>
+                                            <p:cond delay="0"/>
+                                          </p:stCondLst>
+                                        </p:cTn>
+                                        <p:tgtEl>
+                                          <p:spTgt spid="3">
+                                            <p:txEl>
+                                              <p:pRg st="6" end="6"/>
+                                            </p:txEl>
+                                          </p:spTgt>
+                                        </p:tgtEl>
+                                        <p:attrNameLst>
+                                          <p:attrName>style.visibility</p:attrName>
+                                        </p:attrNameLst>
+                                      </p:cBhvr>
+                                      <p:to>
+                                        <p:strVal val="visible"/>
+                                      </p:to>
+                                    </p:set>
+                                  </p:childTnLst>
+                                </p:cTn>
+                              </p:par>
+                              <p:par>
+                                <p:cTn id="15" presetID="1" presetClass="entr" presetSubtype="0" fill="hold" nodeType="withEffect">
+                                  <p:stCondLst>
+                                    <p:cond delay="0"/>
+                                  </p:stCondLst>
+                                  <p:childTnLst>
+                                    <p:set>
+                                      <p:cBhvr>
+                                        <p:cTn id="16" dur="1" fill="hold">
+                                          <p:stCondLst>
+                                            <p:cond delay="0"/>
+                                          </p:stCondLst>
+                                        </p:cTn>
+                                        <p:tgtEl>
+                                          <p:spTgt spid="3">
+                                            <p:txEl>
+                                              <p:pRg st="7" end="7"/>
+                                            </p:txEl>
+                                          </p:spTgt>
+                                        </p:tgtEl>
+                                        <p:attrNameLst>
+                                          <p:attrName>style.visibility</p:attrName>
+                                        </p:attrNameLst>
+                                      </p:cBhvr>
+                                      <p:to>
+                                        <p:strVal val="visible"/>
+                                      </p:to>
+                                    </p:set>
+                                  </p:childTnLst>
+                                </p:cTn>
+                              </p:par>
+                            </p:childTnLst>
+                          </p:cTn>
+                        </p:par>
+                      </p:childTnLst>
+                    </p:cTn>
+                  </p:par>
+                </p:childTnLst>
+              </p:cTn>
+              <p:prevCondLst>
+                <p:cond evt="onPrev" delay="0">
+                  <p:tgtEl>
+                    <p:sldTgt/>
+                  </p:tgtEl>
+                </p:cond>
+              </p:prevCondLst>
+              <p:nextCondLst>
+                <p:cond evt="onNext" delay="0">
+                  <p:tgtEl>
+                    <p:sldTgt/>
+                  </p:tgtEl>
+                </p:cond>
+              </p:nextCondLst>
+            </p:seq>
+          </p:childTnLst>
+        </p:cTn>
       </p:par>
     </p:tnLst>
   </p:timing>

</xml_diff>